<commit_message>
Change Excel cell during chart category name updating (#152)
</commit_message>
<xml_diff>
--- a/ShapeCrawler.Tests.Unit/Resource/025_chart.pptx
+++ b/ShapeCrawler.Tests.Unit/Resource/025_chart.pptx
@@ -5,20 +5,21 @@
     <p:sldMasterId id="2147483648" r:id="rId1"/>
   </p:sldMasterIdLst>
   <p:notesMasterIdLst>
-    <p:notesMasterId r:id="rId5"/>
+    <p:notesMasterId r:id="rId6"/>
   </p:notesMasterIdLst>
   <p:handoutMasterIdLst>
-    <p:handoutMasterId r:id="rId6"/>
+    <p:handoutMasterId r:id="rId7"/>
   </p:handoutMasterIdLst>
   <p:sldIdLst>
     <p:sldId id="357" r:id="rId2"/>
     <p:sldId id="358" r:id="rId3"/>
     <p:sldId id="359" r:id="rId4"/>
+    <p:sldId id="360" r:id="rId5"/>
   </p:sldIdLst>
   <p:sldSz cx="10691813" cy="7559675"/>
   <p:notesSz cx="7315200" cy="9601200"/>
   <p:custDataLst>
-    <p:tags r:id="rId7"/>
+    <p:tags r:id="rId8"/>
   </p:custDataLst>
   <p:defaultTextStyle>
     <a:defPPr>
@@ -1186,7 +1187,7 @@
               </c:numCache>
             </c:numRef>
           </c:val>
-          <c:extLst xmlns:mc="http://schemas.openxmlformats.org/markup-compatibility/2006" xmlns:c14="http://schemas.microsoft.com/office/drawing/2007/8/2/chart" xmlns:c16="http://schemas.microsoft.com/office/drawing/2014/chart" xmlns:c16r3="http://schemas.microsoft.com/office/drawing/2017/03/chart">
+          <c:extLst xmlns:c16r3="http://schemas.microsoft.com/office/drawing/2017/03/chart" xmlns:c16="http://schemas.microsoft.com/office/drawing/2014/chart" xmlns:c14="http://schemas.microsoft.com/office/drawing/2007/8/2/chart" xmlns:mc="http://schemas.openxmlformats.org/markup-compatibility/2006">
             <c:ext xmlns:c16="http://schemas.microsoft.com/office/drawing/2014/chart" uri="{C3380CC4-5D6E-409C-BE32-E72D297353CC}">
               <c16:uniqueId val="{00000004-85FF-4A9E-A301-DA0EAA17C6A6}"/>
             </c:ext>
@@ -1271,7 +1272,7 @@
               </c:numCache>
             </c:numRef>
           </c:val>
-          <c:extLst xmlns:mc="http://schemas.openxmlformats.org/markup-compatibility/2006" xmlns:c14="http://schemas.microsoft.com/office/drawing/2007/8/2/chart" xmlns:c16="http://schemas.microsoft.com/office/drawing/2014/chart" xmlns:c16r3="http://schemas.microsoft.com/office/drawing/2017/03/chart">
+          <c:extLst xmlns:c16r3="http://schemas.microsoft.com/office/drawing/2017/03/chart" xmlns:c16="http://schemas.microsoft.com/office/drawing/2014/chart" xmlns:c14="http://schemas.microsoft.com/office/drawing/2007/8/2/chart" xmlns:mc="http://schemas.openxmlformats.org/markup-compatibility/2006">
             <c:ext xmlns:c16="http://schemas.microsoft.com/office/drawing/2014/chart" uri="{C3380CC4-5D6E-409C-BE32-E72D297353CC}">
               <c16:uniqueId val="{00000009-85FF-4A9E-A301-DA0EAA17C6A6}"/>
             </c:ext>
@@ -1361,7 +1362,7 @@
               </c:numCache>
             </c:numRef>
           </c:val>
-          <c:extLst xmlns:mc="http://schemas.openxmlformats.org/markup-compatibility/2006" xmlns:c14="http://schemas.microsoft.com/office/drawing/2007/8/2/chart" xmlns:c16="http://schemas.microsoft.com/office/drawing/2014/chart" xmlns:c16r3="http://schemas.microsoft.com/office/drawing/2017/03/chart">
+          <c:extLst xmlns:c16r3="http://schemas.microsoft.com/office/drawing/2017/03/chart" xmlns:c16="http://schemas.microsoft.com/office/drawing/2014/chart" xmlns:c14="http://schemas.microsoft.com/office/drawing/2007/8/2/chart" xmlns:mc="http://schemas.openxmlformats.org/markup-compatibility/2006">
             <c:ext xmlns:c16="http://schemas.microsoft.com/office/drawing/2014/chart" uri="{C3380CC4-5D6E-409C-BE32-E72D297353CC}">
               <c16:uniqueId val="{0000000E-85FF-4A9E-A301-DA0EAA17C6A6}"/>
             </c:ext>
@@ -1446,7 +1447,7 @@
               </c:numCache>
             </c:numRef>
           </c:val>
-          <c:extLst xmlns:mc="http://schemas.openxmlformats.org/markup-compatibility/2006" xmlns:c14="http://schemas.microsoft.com/office/drawing/2007/8/2/chart" xmlns:c16="http://schemas.microsoft.com/office/drawing/2014/chart" xmlns:c16r3="http://schemas.microsoft.com/office/drawing/2017/03/chart">
+          <c:extLst xmlns:c16r3="http://schemas.microsoft.com/office/drawing/2017/03/chart" xmlns:c16="http://schemas.microsoft.com/office/drawing/2014/chart" xmlns:c14="http://schemas.microsoft.com/office/drawing/2007/8/2/chart" xmlns:mc="http://schemas.openxmlformats.org/markup-compatibility/2006">
             <c:ext xmlns:c16="http://schemas.microsoft.com/office/drawing/2014/chart" uri="{C3380CC4-5D6E-409C-BE32-E72D297353CC}">
               <c16:uniqueId val="{00000013-85FF-4A9E-A301-DA0EAA17C6A6}"/>
             </c:ext>
@@ -1504,7 +1505,7 @@
     </c:legend>
     <c:plotVisOnly val="1"/>
     <c:dispBlanksAs val="gap"/>
-    <c:extLst xmlns:mc="http://schemas.openxmlformats.org/markup-compatibility/2006" xmlns:c14="http://schemas.microsoft.com/office/drawing/2007/8/2/chart" xmlns:c16="http://schemas.microsoft.com/office/drawing/2014/chart" xmlns:c16r3="http://schemas.microsoft.com/office/drawing/2017/03/chart">
+    <c:extLst xmlns:c16r3="http://schemas.microsoft.com/office/drawing/2017/03/chart" xmlns:c16="http://schemas.microsoft.com/office/drawing/2014/chart" xmlns:c14="http://schemas.microsoft.com/office/drawing/2007/8/2/chart" xmlns:mc="http://schemas.openxmlformats.org/markup-compatibility/2006">
       <c:ext xmlns:c16r3="http://schemas.microsoft.com/office/drawing/2017/03/chart" uri="{56B9EC1D-385E-4148-901F-78D8002777C0}">
         <c16r3:dataDisplayOptions16>
           <c16r3:dispNaAsBlank val="1"/>
@@ -1650,7 +1651,7 @@
             </c:numRef>
           </c:yVal>
           <c:smooth val="1"/>
-          <c:extLst xmlns:c16="http://schemas.microsoft.com/office/drawing/2014/chart" xmlns:c14="http://schemas.microsoft.com/office/drawing/2007/8/2/chart" xmlns:mc="http://schemas.openxmlformats.org/markup-compatibility/2006">
+          <c:extLst xmlns:mc="http://schemas.openxmlformats.org/markup-compatibility/2006" xmlns:c14="http://schemas.microsoft.com/office/drawing/2007/8/2/chart" xmlns:c16="http://schemas.microsoft.com/office/drawing/2014/chart">
             <c:ext xmlns:c16="http://schemas.microsoft.com/office/drawing/2014/chart" uri="{C3380CC4-5D6E-409C-BE32-E72D297353CC}">
               <c16:uniqueId val="{00000000-9B82-4F0A-BBF2-F487496F06C9}"/>
             </c:ext>
@@ -1737,7 +1738,7 @@
             </c:numRef>
           </c:yVal>
           <c:smooth val="1"/>
-          <c:extLst xmlns:c16="http://schemas.microsoft.com/office/drawing/2014/chart" xmlns:c14="http://schemas.microsoft.com/office/drawing/2007/8/2/chart" xmlns:mc="http://schemas.openxmlformats.org/markup-compatibility/2006">
+          <c:extLst xmlns:mc="http://schemas.openxmlformats.org/markup-compatibility/2006" xmlns:c14="http://schemas.microsoft.com/office/drawing/2007/8/2/chart" xmlns:c16="http://schemas.microsoft.com/office/drawing/2014/chart">
             <c:ext xmlns:c16="http://schemas.microsoft.com/office/drawing/2014/chart" uri="{C3380CC4-5D6E-409C-BE32-E72D297353CC}">
               <c16:uniqueId val="{00000001-9B82-4F0A-BBF2-F487496F06C9}"/>
             </c:ext>
@@ -1824,7 +1825,7 @@
             </c:numRef>
           </c:yVal>
           <c:smooth val="1"/>
-          <c:extLst xmlns:c16="http://schemas.microsoft.com/office/drawing/2014/chart" xmlns:c14="http://schemas.microsoft.com/office/drawing/2007/8/2/chart" xmlns:mc="http://schemas.openxmlformats.org/markup-compatibility/2006">
+          <c:extLst xmlns:mc="http://schemas.openxmlformats.org/markup-compatibility/2006" xmlns:c14="http://schemas.microsoft.com/office/drawing/2007/8/2/chart" xmlns:c16="http://schemas.microsoft.com/office/drawing/2014/chart">
             <c:ext xmlns:c16="http://schemas.microsoft.com/office/drawing/2014/chart" uri="{C3380CC4-5D6E-409C-BE32-E72D297353CC}">
               <c16:uniqueId val="{00000002-9B82-4F0A-BBF2-F487496F06C9}"/>
             </c:ext>
@@ -2058,7 +2059,7 @@
                       <a:t>[VALUE]</a:t>
                     </a:fld>
                     <a:r>
-                      <a:rPr lang="uk-UA"/>
+                      <a:rPr lang="ru-RU"/>
                       <a:t>млн.</a:t>
                     </a:r>
                   </a:p>
@@ -2098,7 +2099,7 @@
               <c:showSerName val="0"/>
               <c:showPercent val="0"/>
               <c:showBubbleSize val="0"/>
-              <c:extLst xmlns:mc="http://schemas.openxmlformats.org/markup-compatibility/2006" xmlns:c14="http://schemas.microsoft.com/office/drawing/2007/8/2/chart" xmlns:c15="http://schemas.microsoft.com/office/drawing/2012/chart" xmlns:c16="http://schemas.microsoft.com/office/drawing/2014/chart">
+              <c:extLst xmlns:c16="http://schemas.microsoft.com/office/drawing/2014/chart" xmlns:c15="http://schemas.microsoft.com/office/drawing/2012/chart" xmlns:c14="http://schemas.microsoft.com/office/drawing/2007/8/2/chart" xmlns:mc="http://schemas.openxmlformats.org/markup-compatibility/2006">
                 <c:ext xmlns:c15="http://schemas.microsoft.com/office/drawing/2012/chart" uri="{CE6537A1-D6FC-4f65-9D91-7224C49458BB}">
                   <c15:dlblFieldTable/>
                   <c15:showDataLabelsRange val="0"/>
@@ -2147,7 +2148,7 @@
                       <a:t>[VALUE]</a:t>
                     </a:fld>
                     <a:r>
-                      <a:rPr lang="uk-UA">
+                      <a:rPr lang="ru-RU">
                         <a:solidFill>
                           <a:schemeClr val="bg1"/>
                         </a:solidFill>
@@ -2188,7 +2189,7 @@
               <c:showSerName val="0"/>
               <c:showPercent val="0"/>
               <c:showBubbleSize val="0"/>
-              <c:extLst xmlns:mc="http://schemas.openxmlformats.org/markup-compatibility/2006" xmlns:c14="http://schemas.microsoft.com/office/drawing/2007/8/2/chart" xmlns:c15="http://schemas.microsoft.com/office/drawing/2012/chart" xmlns:c16="http://schemas.microsoft.com/office/drawing/2014/chart">
+              <c:extLst xmlns:c16="http://schemas.microsoft.com/office/drawing/2014/chart" xmlns:c15="http://schemas.microsoft.com/office/drawing/2012/chart" xmlns:c14="http://schemas.microsoft.com/office/drawing/2007/8/2/chart" xmlns:mc="http://schemas.openxmlformats.org/markup-compatibility/2006">
                 <c:ext xmlns:c15="http://schemas.microsoft.com/office/drawing/2012/chart" uri="{CE6537A1-D6FC-4f65-9D91-7224C49458BB}">
                   <c15:layout>
                     <c:manualLayout>
@@ -2251,7 +2252,7 @@
                       <a:t> </a:t>
                     </a:r>
                     <a:r>
-                      <a:rPr lang="uk-UA">
+                      <a:rPr lang="ru-RU">
                         <a:solidFill>
                           <a:schemeClr val="bg1"/>
                         </a:solidFill>
@@ -2292,7 +2293,7 @@
               <c:showSerName val="0"/>
               <c:showPercent val="0"/>
               <c:showBubbleSize val="0"/>
-              <c:extLst xmlns:mc="http://schemas.openxmlformats.org/markup-compatibility/2006" xmlns:c14="http://schemas.microsoft.com/office/drawing/2007/8/2/chart" xmlns:c15="http://schemas.microsoft.com/office/drawing/2012/chart" xmlns:c16="http://schemas.microsoft.com/office/drawing/2014/chart">
+              <c:extLst xmlns:c16="http://schemas.microsoft.com/office/drawing/2014/chart" xmlns:c15="http://schemas.microsoft.com/office/drawing/2012/chart" xmlns:c14="http://schemas.microsoft.com/office/drawing/2007/8/2/chart" xmlns:mc="http://schemas.openxmlformats.org/markup-compatibility/2006">
                 <c:ext xmlns:c15="http://schemas.microsoft.com/office/drawing/2012/chart" uri="{CE6537A1-D6FC-4f65-9D91-7224C49458BB}">
                   <c15:layout>
                     <c:manualLayout>
@@ -2342,7 +2343,7 @@
             <c:showPercent val="0"/>
             <c:showBubbleSize val="0"/>
             <c:showLeaderLines val="0"/>
-            <c:extLst xmlns:mc="http://schemas.openxmlformats.org/markup-compatibility/2006" xmlns:c14="http://schemas.microsoft.com/office/drawing/2007/8/2/chart" xmlns:c15="http://schemas.microsoft.com/office/drawing/2012/chart" xmlns:c16="http://schemas.microsoft.com/office/drawing/2014/chart">
+            <c:extLst xmlns:c16="http://schemas.microsoft.com/office/drawing/2014/chart" xmlns:c15="http://schemas.microsoft.com/office/drawing/2012/chart" xmlns:c14="http://schemas.microsoft.com/office/drawing/2007/8/2/chart" xmlns:mc="http://schemas.openxmlformats.org/markup-compatibility/2006">
               <c:ext xmlns:c15="http://schemas.microsoft.com/office/drawing/2012/chart" uri="{CE6537A1-D6FC-4f65-9D91-7224C49458BB}">
                 <c15:showLeaderLines val="1"/>
                 <c15:leaderLines>
@@ -2397,7 +2398,7 @@
               </c:numCache>
             </c:numRef>
           </c:val>
-          <c:extLst xmlns:mc="http://schemas.openxmlformats.org/markup-compatibility/2006" xmlns:c14="http://schemas.microsoft.com/office/drawing/2007/8/2/chart" xmlns:c15="http://schemas.microsoft.com/office/drawing/2012/chart" xmlns:c16="http://schemas.microsoft.com/office/drawing/2014/chart">
+          <c:extLst xmlns:c16="http://schemas.microsoft.com/office/drawing/2014/chart" xmlns:c15="http://schemas.microsoft.com/office/drawing/2012/chart" xmlns:c14="http://schemas.microsoft.com/office/drawing/2007/8/2/chart" xmlns:mc="http://schemas.openxmlformats.org/markup-compatibility/2006">
             <c:ext xmlns:c16="http://schemas.microsoft.com/office/drawing/2014/chart" uri="{C3380CC4-5D6E-409C-BE32-E72D297353CC}">
               <c16:uniqueId val="{00000003-355C-46C5-8EE8-42EFA5183349}"/>
             </c:ext>
@@ -2928,6 +2929,495 @@
           </a:p>
         </c:txPr>
         <c:crossAx val="898842399"/>
+        <c:crosses val="autoZero"/>
+        <c:crossBetween val="between"/>
+      </c:valAx>
+      <c:spPr>
+        <a:noFill/>
+        <a:ln>
+          <a:noFill/>
+        </a:ln>
+        <a:effectLst/>
+      </c:spPr>
+    </c:plotArea>
+    <c:legend>
+      <c:legendPos val="b"/>
+      <c:overlay val="0"/>
+      <c:spPr>
+        <a:noFill/>
+        <a:ln>
+          <a:noFill/>
+        </a:ln>
+        <a:effectLst/>
+      </c:spPr>
+      <c:txPr>
+        <a:bodyPr rot="0" spcFirstLastPara="1" vertOverflow="ellipsis" vert="horz" wrap="square" anchor="ctr" anchorCtr="1"/>
+        <a:lstStyle/>
+        <a:p>
+          <a:pPr>
+            <a:defRPr sz="1197" b="0" i="0" u="none" strike="noStrike" kern="1200" baseline="0">
+              <a:solidFill>
+                <a:schemeClr val="tx1">
+                  <a:lumMod val="65000"/>
+                  <a:lumOff val="35000"/>
+                </a:schemeClr>
+              </a:solidFill>
+              <a:latin typeface="+mn-lt"/>
+              <a:ea typeface="+mn-ea"/>
+              <a:cs typeface="+mn-cs"/>
+            </a:defRPr>
+          </a:pPr>
+          <a:endParaRPr lang="en-US"/>
+        </a:p>
+      </c:txPr>
+    </c:legend>
+    <c:plotVisOnly val="1"/>
+    <c:dispBlanksAs val="gap"/>
+    <c:extLst>
+      <c:ext xmlns:c16r3="http://schemas.microsoft.com/office/drawing/2017/03/chart" uri="{56B9EC1D-385E-4148-901F-78D8002777C0}">
+        <c16r3:dataDisplayOptions16>
+          <c16r3:dispNaAsBlank val="1"/>
+        </c16r3:dataDisplayOptions16>
+      </c:ext>
+    </c:extLst>
+    <c:showDLblsOverMax val="0"/>
+  </c:chart>
+  <c:spPr>
+    <a:noFill/>
+    <a:ln>
+      <a:noFill/>
+    </a:ln>
+    <a:effectLst/>
+  </c:spPr>
+  <c:txPr>
+    <a:bodyPr/>
+    <a:lstStyle/>
+    <a:p>
+      <a:pPr>
+        <a:defRPr/>
+      </a:pPr>
+      <a:endParaRPr lang="en-US"/>
+    </a:p>
+  </c:txPr>
+  <c:externalData r:id="rId3">
+    <c:autoUpdate val="0"/>
+  </c:externalData>
+</c:chartSpace>
+</file>
+
+<file path=ppt/charts/chart8.xml><?xml version="1.0" encoding="utf-8"?>
+<c:chartSpace xmlns:c="http://schemas.openxmlformats.org/drawingml/2006/chart" xmlns:a="http://schemas.openxmlformats.org/drawingml/2006/main" xmlns:r="http://schemas.openxmlformats.org/officeDocument/2006/relationships" xmlns:c16r2="http://schemas.microsoft.com/office/drawing/2015/06/chart">
+  <c:date1904 val="0"/>
+  <c:lang val="en-US"/>
+  <c:roundedCorners val="0"/>
+  <mc:AlternateContent xmlns:mc="http://schemas.openxmlformats.org/markup-compatibility/2006">
+    <mc:Choice xmlns:c14="http://schemas.microsoft.com/office/drawing/2007/8/2/chart" Requires="c14">
+      <c14:style val="102"/>
+    </mc:Choice>
+    <mc:Fallback>
+      <c:style val="2"/>
+    </mc:Fallback>
+  </mc:AlternateContent>
+  <c:chart>
+    <c:title>
+      <c:tx>
+        <c:rich>
+          <a:bodyPr rot="0" spcFirstLastPara="1" vertOverflow="ellipsis" vert="horz" wrap="square" anchor="ctr" anchorCtr="1"/>
+          <a:lstStyle/>
+          <a:p>
+            <a:pPr>
+              <a:defRPr sz="1862" b="0" i="0" u="none" strike="noStrike" kern="1200" spc="0" baseline="0">
+                <a:solidFill>
+                  <a:schemeClr val="tx1">
+                    <a:lumMod val="65000"/>
+                    <a:lumOff val="35000"/>
+                  </a:schemeClr>
+                </a:solidFill>
+                <a:latin typeface="+mn-lt"/>
+                <a:ea typeface="+mn-ea"/>
+                <a:cs typeface="+mn-cs"/>
+              </a:defRPr>
+            </a:pPr>
+            <a:r>
+              <a:rPr lang="en-US" dirty="0"/>
+              <a:t>Line Chart_id13</a:t>
+            </a:r>
+          </a:p>
+        </c:rich>
+      </c:tx>
+      <c:overlay val="0"/>
+      <c:spPr>
+        <a:noFill/>
+        <a:ln>
+          <a:noFill/>
+        </a:ln>
+        <a:effectLst/>
+      </c:spPr>
+      <c:txPr>
+        <a:bodyPr rot="0" spcFirstLastPara="1" vertOverflow="ellipsis" vert="horz" wrap="square" anchor="ctr" anchorCtr="1"/>
+        <a:lstStyle/>
+        <a:p>
+          <a:pPr>
+            <a:defRPr sz="1862" b="0" i="0" u="none" strike="noStrike" kern="1200" spc="0" baseline="0">
+              <a:solidFill>
+                <a:schemeClr val="tx1">
+                  <a:lumMod val="65000"/>
+                  <a:lumOff val="35000"/>
+                </a:schemeClr>
+              </a:solidFill>
+              <a:latin typeface="+mn-lt"/>
+              <a:ea typeface="+mn-ea"/>
+              <a:cs typeface="+mn-cs"/>
+            </a:defRPr>
+          </a:pPr>
+          <a:endParaRPr lang="en-US"/>
+        </a:p>
+      </c:txPr>
+    </c:title>
+    <c:autoTitleDeleted val="0"/>
+    <c:plotArea>
+      <c:layout/>
+      <c:lineChart>
+        <c:grouping val="standard"/>
+        <c:varyColors val="0"/>
+        <c:ser>
+          <c:idx val="0"/>
+          <c:order val="0"/>
+          <c:tx>
+            <c:strRef>
+              <c:f>Sheet1!$B$1</c:f>
+              <c:strCache>
+                <c:ptCount val="1"/>
+                <c:pt idx="0">
+                  <c:v>Series 1</c:v>
+                </c:pt>
+              </c:strCache>
+            </c:strRef>
+          </c:tx>
+          <c:spPr>
+            <a:ln w="28575" cap="rnd">
+              <a:solidFill>
+                <a:schemeClr val="accent1"/>
+              </a:solidFill>
+              <a:round/>
+            </a:ln>
+            <a:effectLst/>
+          </c:spPr>
+          <c:marker>
+            <c:symbol val="none"/>
+          </c:marker>
+          <c:cat>
+            <c:strRef>
+              <c:f>Sheet1!$A$2:$A$5</c:f>
+              <c:strCache>
+                <c:ptCount val="4"/>
+                <c:pt idx="0">
+                  <c:v>Category 1</c:v>
+                </c:pt>
+                <c:pt idx="1">
+                  <c:v>Category 2</c:v>
+                </c:pt>
+                <c:pt idx="2">
+                  <c:v>Category 3</c:v>
+                </c:pt>
+                <c:pt idx="3">
+                  <c:v>Category 4</c:v>
+                </c:pt>
+              </c:strCache>
+            </c:strRef>
+          </c:cat>
+          <c:val>
+            <c:numRef>
+              <c:f>Sheet1!$B$2:$B$5</c:f>
+              <c:numCache>
+                <c:formatCode>General</c:formatCode>
+                <c:ptCount val="4"/>
+                <c:pt idx="0">
+                  <c:v>4.3</c:v>
+                </c:pt>
+                <c:pt idx="1">
+                  <c:v>2.5</c:v>
+                </c:pt>
+                <c:pt idx="2">
+                  <c:v>3.5</c:v>
+                </c:pt>
+                <c:pt idx="3">
+                  <c:v>4.5</c:v>
+                </c:pt>
+              </c:numCache>
+            </c:numRef>
+          </c:val>
+          <c:smooth val="0"/>
+          <c:extLst>
+            <c:ext xmlns:c16="http://schemas.microsoft.com/office/drawing/2014/chart" uri="{C3380CC4-5D6E-409C-BE32-E72D297353CC}">
+              <c16:uniqueId val="{00000000-4227-4C39-BD41-7867225ACEB0}"/>
+            </c:ext>
+          </c:extLst>
+        </c:ser>
+        <c:ser>
+          <c:idx val="1"/>
+          <c:order val="1"/>
+          <c:tx>
+            <c:strRef>
+              <c:f>Sheet1!$C$1</c:f>
+              <c:strCache>
+                <c:ptCount val="1"/>
+                <c:pt idx="0">
+                  <c:v>Series 2</c:v>
+                </c:pt>
+              </c:strCache>
+            </c:strRef>
+          </c:tx>
+          <c:spPr>
+            <a:ln w="28575" cap="rnd">
+              <a:solidFill>
+                <a:schemeClr val="accent2"/>
+              </a:solidFill>
+              <a:round/>
+            </a:ln>
+            <a:effectLst/>
+          </c:spPr>
+          <c:marker>
+            <c:symbol val="none"/>
+          </c:marker>
+          <c:cat>
+            <c:strRef>
+              <c:f>Sheet1!$A$2:$A$5</c:f>
+              <c:strCache>
+                <c:ptCount val="4"/>
+                <c:pt idx="0">
+                  <c:v>Category 1</c:v>
+                </c:pt>
+                <c:pt idx="1">
+                  <c:v>Category 2</c:v>
+                </c:pt>
+                <c:pt idx="2">
+                  <c:v>Category 3</c:v>
+                </c:pt>
+                <c:pt idx="3">
+                  <c:v>Category 4</c:v>
+                </c:pt>
+              </c:strCache>
+            </c:strRef>
+          </c:cat>
+          <c:val>
+            <c:numRef>
+              <c:f>Sheet1!$C$2:$C$5</c:f>
+              <c:numCache>
+                <c:formatCode>General</c:formatCode>
+                <c:ptCount val="4"/>
+                <c:pt idx="0">
+                  <c:v>2.4</c:v>
+                </c:pt>
+                <c:pt idx="1">
+                  <c:v>4.4000000000000004</c:v>
+                </c:pt>
+                <c:pt idx="2">
+                  <c:v>1.8</c:v>
+                </c:pt>
+                <c:pt idx="3">
+                  <c:v>2.8</c:v>
+                </c:pt>
+              </c:numCache>
+            </c:numRef>
+          </c:val>
+          <c:smooth val="0"/>
+          <c:extLst>
+            <c:ext xmlns:c16="http://schemas.microsoft.com/office/drawing/2014/chart" uri="{C3380CC4-5D6E-409C-BE32-E72D297353CC}">
+              <c16:uniqueId val="{00000001-4227-4C39-BD41-7867225ACEB0}"/>
+            </c:ext>
+          </c:extLst>
+        </c:ser>
+        <c:ser>
+          <c:idx val="2"/>
+          <c:order val="2"/>
+          <c:tx>
+            <c:strRef>
+              <c:f>Sheet1!$D$1</c:f>
+              <c:strCache>
+                <c:ptCount val="1"/>
+                <c:pt idx="0">
+                  <c:v>Series 3</c:v>
+                </c:pt>
+              </c:strCache>
+            </c:strRef>
+          </c:tx>
+          <c:spPr>
+            <a:ln w="28575" cap="rnd">
+              <a:solidFill>
+                <a:schemeClr val="accent3"/>
+              </a:solidFill>
+              <a:round/>
+            </a:ln>
+            <a:effectLst/>
+          </c:spPr>
+          <c:marker>
+            <c:symbol val="none"/>
+          </c:marker>
+          <c:cat>
+            <c:strRef>
+              <c:f>Sheet1!$A$2:$A$5</c:f>
+              <c:strCache>
+                <c:ptCount val="4"/>
+                <c:pt idx="0">
+                  <c:v>Category 1</c:v>
+                </c:pt>
+                <c:pt idx="1">
+                  <c:v>Category 2</c:v>
+                </c:pt>
+                <c:pt idx="2">
+                  <c:v>Category 3</c:v>
+                </c:pt>
+                <c:pt idx="3">
+                  <c:v>Category 4</c:v>
+                </c:pt>
+              </c:strCache>
+            </c:strRef>
+          </c:cat>
+          <c:val>
+            <c:numRef>
+              <c:f>Sheet1!$D$2:$D$5</c:f>
+              <c:numCache>
+                <c:formatCode>General</c:formatCode>
+                <c:ptCount val="4"/>
+                <c:pt idx="0">
+                  <c:v>2</c:v>
+                </c:pt>
+                <c:pt idx="1">
+                  <c:v>2</c:v>
+                </c:pt>
+                <c:pt idx="2">
+                  <c:v>3</c:v>
+                </c:pt>
+                <c:pt idx="3">
+                  <c:v>5</c:v>
+                </c:pt>
+              </c:numCache>
+            </c:numRef>
+          </c:val>
+          <c:smooth val="0"/>
+          <c:extLst>
+            <c:ext xmlns:c16="http://schemas.microsoft.com/office/drawing/2014/chart" uri="{C3380CC4-5D6E-409C-BE32-E72D297353CC}">
+              <c16:uniqueId val="{00000002-4227-4C39-BD41-7867225ACEB0}"/>
+            </c:ext>
+          </c:extLst>
+        </c:ser>
+        <c:dLbls>
+          <c:showLegendKey val="0"/>
+          <c:showVal val="0"/>
+          <c:showCatName val="0"/>
+          <c:showSerName val="0"/>
+          <c:showPercent val="0"/>
+          <c:showBubbleSize val="0"/>
+        </c:dLbls>
+        <c:smooth val="0"/>
+        <c:axId val="395805631"/>
+        <c:axId val="395797727"/>
+      </c:lineChart>
+      <c:catAx>
+        <c:axId val="395805631"/>
+        <c:scaling>
+          <c:orientation val="minMax"/>
+        </c:scaling>
+        <c:delete val="0"/>
+        <c:axPos val="b"/>
+        <c:numFmt formatCode="General" sourceLinked="1"/>
+        <c:majorTickMark val="none"/>
+        <c:minorTickMark val="none"/>
+        <c:tickLblPos val="nextTo"/>
+        <c:spPr>
+          <a:noFill/>
+          <a:ln w="9525" cap="flat" cmpd="sng" algn="ctr">
+            <a:solidFill>
+              <a:schemeClr val="tx1">
+                <a:lumMod val="15000"/>
+                <a:lumOff val="85000"/>
+              </a:schemeClr>
+            </a:solidFill>
+            <a:round/>
+          </a:ln>
+          <a:effectLst/>
+        </c:spPr>
+        <c:txPr>
+          <a:bodyPr rot="-60000000" spcFirstLastPara="1" vertOverflow="ellipsis" vert="horz" wrap="square" anchor="ctr" anchorCtr="1"/>
+          <a:lstStyle/>
+          <a:p>
+            <a:pPr>
+              <a:defRPr sz="1197" b="0" i="0" u="none" strike="noStrike" kern="1200" baseline="0">
+                <a:solidFill>
+                  <a:schemeClr val="tx1">
+                    <a:lumMod val="65000"/>
+                    <a:lumOff val="35000"/>
+                  </a:schemeClr>
+                </a:solidFill>
+                <a:latin typeface="+mn-lt"/>
+                <a:ea typeface="+mn-ea"/>
+                <a:cs typeface="+mn-cs"/>
+              </a:defRPr>
+            </a:pPr>
+            <a:endParaRPr lang="en-US"/>
+          </a:p>
+        </c:txPr>
+        <c:crossAx val="395797727"/>
+        <c:crosses val="autoZero"/>
+        <c:auto val="1"/>
+        <c:lblAlgn val="ctr"/>
+        <c:lblOffset val="100"/>
+        <c:noMultiLvlLbl val="0"/>
+      </c:catAx>
+      <c:valAx>
+        <c:axId val="395797727"/>
+        <c:scaling>
+          <c:orientation val="minMax"/>
+        </c:scaling>
+        <c:delete val="0"/>
+        <c:axPos val="l"/>
+        <c:majorGridlines>
+          <c:spPr>
+            <a:ln w="9525" cap="flat" cmpd="sng" algn="ctr">
+              <a:solidFill>
+                <a:schemeClr val="tx1">
+                  <a:lumMod val="15000"/>
+                  <a:lumOff val="85000"/>
+                </a:schemeClr>
+              </a:solidFill>
+              <a:round/>
+            </a:ln>
+            <a:effectLst/>
+          </c:spPr>
+        </c:majorGridlines>
+        <c:numFmt formatCode="General" sourceLinked="1"/>
+        <c:majorTickMark val="none"/>
+        <c:minorTickMark val="none"/>
+        <c:tickLblPos val="nextTo"/>
+        <c:spPr>
+          <a:noFill/>
+          <a:ln>
+            <a:noFill/>
+          </a:ln>
+          <a:effectLst/>
+        </c:spPr>
+        <c:txPr>
+          <a:bodyPr rot="-60000000" spcFirstLastPara="1" vertOverflow="ellipsis" vert="horz" wrap="square" anchor="ctr" anchorCtr="1"/>
+          <a:lstStyle/>
+          <a:p>
+            <a:pPr>
+              <a:defRPr sz="1197" b="0" i="0" u="none" strike="noStrike" kern="1200" baseline="0">
+                <a:solidFill>
+                  <a:schemeClr val="tx1">
+                    <a:lumMod val="65000"/>
+                    <a:lumOff val="35000"/>
+                  </a:schemeClr>
+                </a:solidFill>
+                <a:latin typeface="+mn-lt"/>
+                <a:ea typeface="+mn-ea"/>
+                <a:cs typeface="+mn-cs"/>
+              </a:defRPr>
+            </a:pPr>
+            <a:endParaRPr lang="en-US"/>
+          </a:p>
+        </c:txPr>
+        <c:crossAx val="395805631"/>
         <c:crosses val="autoZero"/>
         <c:crossBetween val="between"/>
       </c:valAx>
@@ -3244,6 +3734,46 @@
 </cs:colorStyle>
 </file>
 
+<file path=ppt/charts/colors7.xml><?xml version="1.0" encoding="utf-8"?>
+<cs:colorStyle xmlns:cs="http://schemas.microsoft.com/office/drawing/2012/chartStyle" xmlns:a="http://schemas.openxmlformats.org/drawingml/2006/main" meth="cycle" id="10">
+  <a:schemeClr val="accent1"/>
+  <a:schemeClr val="accent2"/>
+  <a:schemeClr val="accent3"/>
+  <a:schemeClr val="accent4"/>
+  <a:schemeClr val="accent5"/>
+  <a:schemeClr val="accent6"/>
+  <cs:variation/>
+  <cs:variation>
+    <a:lumMod val="60000"/>
+  </cs:variation>
+  <cs:variation>
+    <a:lumMod val="80000"/>
+    <a:lumOff val="20000"/>
+  </cs:variation>
+  <cs:variation>
+    <a:lumMod val="80000"/>
+  </cs:variation>
+  <cs:variation>
+    <a:lumMod val="60000"/>
+    <a:lumOff val="40000"/>
+  </cs:variation>
+  <cs:variation>
+    <a:lumMod val="50000"/>
+  </cs:variation>
+  <cs:variation>
+    <a:lumMod val="70000"/>
+    <a:lumOff val="30000"/>
+  </cs:variation>
+  <cs:variation>
+    <a:lumMod val="70000"/>
+  </cs:variation>
+  <cs:variation>
+    <a:lumMod val="50000"/>
+    <a:lumOff val="50000"/>
+  </cs:variation>
+</cs:colorStyle>
+</file>
+
 <file path=ppt/charts/style1.xml><?xml version="1.0" encoding="utf-8"?>
 <cs:chartStyle xmlns:cs="http://schemas.microsoft.com/office/drawing/2012/chartStyle" xmlns:a="http://schemas.openxmlformats.org/drawingml/2006/main" id="216">
   <cs:axisTitle>
@@ -5850,6 +6380,522 @@
       <a:schemeClr val="tx1"/>
     </cs:fontRef>
     <cs:spPr>
+      <a:ln w="9525">
+        <a:solidFill>
+          <a:schemeClr val="phClr"/>
+        </a:solidFill>
+      </a:ln>
+    </cs:spPr>
+  </cs:dataPointMarker>
+  <cs:dataPointMarkerLayout symbol="circle" size="5"/>
+  <cs:dataPointWireframe>
+    <cs:lnRef idx="0">
+      <cs:styleClr val="auto"/>
+    </cs:lnRef>
+    <cs:fillRef idx="1"/>
+    <cs:effectRef idx="0"/>
+    <cs:fontRef idx="minor">
+      <a:schemeClr val="tx1"/>
+    </cs:fontRef>
+    <cs:spPr>
+      <a:ln w="9525" cap="rnd">
+        <a:solidFill>
+          <a:schemeClr val="phClr"/>
+        </a:solidFill>
+        <a:round/>
+      </a:ln>
+    </cs:spPr>
+  </cs:dataPointWireframe>
+  <cs:dataTable>
+    <cs:lnRef idx="0"/>
+    <cs:fillRef idx="0"/>
+    <cs:effectRef idx="0"/>
+    <cs:fontRef idx="minor">
+      <a:schemeClr val="tx1">
+        <a:lumMod val="65000"/>
+        <a:lumOff val="35000"/>
+      </a:schemeClr>
+    </cs:fontRef>
+    <cs:spPr>
+      <a:noFill/>
+      <a:ln w="9525" cap="flat" cmpd="sng" algn="ctr">
+        <a:solidFill>
+          <a:schemeClr val="tx1">
+            <a:lumMod val="15000"/>
+            <a:lumOff val="85000"/>
+          </a:schemeClr>
+        </a:solidFill>
+        <a:round/>
+      </a:ln>
+    </cs:spPr>
+    <cs:defRPr sz="1197" kern="1200"/>
+  </cs:dataTable>
+  <cs:downBar>
+    <cs:lnRef idx="0"/>
+    <cs:fillRef idx="0"/>
+    <cs:effectRef idx="0"/>
+    <cs:fontRef idx="minor">
+      <a:schemeClr val="dk1"/>
+    </cs:fontRef>
+    <cs:spPr>
+      <a:solidFill>
+        <a:schemeClr val="dk1">
+          <a:lumMod val="65000"/>
+          <a:lumOff val="35000"/>
+        </a:schemeClr>
+      </a:solidFill>
+      <a:ln w="9525">
+        <a:solidFill>
+          <a:schemeClr val="tx1">
+            <a:lumMod val="65000"/>
+            <a:lumOff val="35000"/>
+          </a:schemeClr>
+        </a:solidFill>
+      </a:ln>
+    </cs:spPr>
+  </cs:downBar>
+  <cs:dropLine>
+    <cs:lnRef idx="0"/>
+    <cs:fillRef idx="0"/>
+    <cs:effectRef idx="0"/>
+    <cs:fontRef idx="minor">
+      <a:schemeClr val="tx1"/>
+    </cs:fontRef>
+    <cs:spPr>
+      <a:ln w="9525" cap="flat" cmpd="sng" algn="ctr">
+        <a:solidFill>
+          <a:schemeClr val="tx1">
+            <a:lumMod val="35000"/>
+            <a:lumOff val="65000"/>
+          </a:schemeClr>
+        </a:solidFill>
+        <a:round/>
+      </a:ln>
+    </cs:spPr>
+  </cs:dropLine>
+  <cs:errorBar>
+    <cs:lnRef idx="0"/>
+    <cs:fillRef idx="0"/>
+    <cs:effectRef idx="0"/>
+    <cs:fontRef idx="minor">
+      <a:schemeClr val="tx1"/>
+    </cs:fontRef>
+    <cs:spPr>
+      <a:ln w="9525" cap="flat" cmpd="sng" algn="ctr">
+        <a:solidFill>
+          <a:schemeClr val="tx1">
+            <a:lumMod val="65000"/>
+            <a:lumOff val="35000"/>
+          </a:schemeClr>
+        </a:solidFill>
+        <a:round/>
+      </a:ln>
+    </cs:spPr>
+  </cs:errorBar>
+  <cs:floor>
+    <cs:lnRef idx="0"/>
+    <cs:fillRef idx="0"/>
+    <cs:effectRef idx="0"/>
+    <cs:fontRef idx="minor">
+      <a:schemeClr val="tx1"/>
+    </cs:fontRef>
+    <cs:spPr>
+      <a:noFill/>
+      <a:ln>
+        <a:noFill/>
+      </a:ln>
+    </cs:spPr>
+  </cs:floor>
+  <cs:gridlineMajor>
+    <cs:lnRef idx="0"/>
+    <cs:fillRef idx="0"/>
+    <cs:effectRef idx="0"/>
+    <cs:fontRef idx="minor">
+      <a:schemeClr val="tx1"/>
+    </cs:fontRef>
+    <cs:spPr>
+      <a:ln w="9525" cap="flat" cmpd="sng" algn="ctr">
+        <a:solidFill>
+          <a:schemeClr val="tx1">
+            <a:lumMod val="15000"/>
+            <a:lumOff val="85000"/>
+          </a:schemeClr>
+        </a:solidFill>
+        <a:round/>
+      </a:ln>
+    </cs:spPr>
+  </cs:gridlineMajor>
+  <cs:gridlineMinor>
+    <cs:lnRef idx="0"/>
+    <cs:fillRef idx="0"/>
+    <cs:effectRef idx="0"/>
+    <cs:fontRef idx="minor">
+      <a:schemeClr val="tx1"/>
+    </cs:fontRef>
+    <cs:spPr>
+      <a:ln w="9525" cap="flat" cmpd="sng" algn="ctr">
+        <a:solidFill>
+          <a:schemeClr val="tx1">
+            <a:lumMod val="5000"/>
+            <a:lumOff val="95000"/>
+          </a:schemeClr>
+        </a:solidFill>
+        <a:round/>
+      </a:ln>
+    </cs:spPr>
+  </cs:gridlineMinor>
+  <cs:hiLoLine>
+    <cs:lnRef idx="0"/>
+    <cs:fillRef idx="0"/>
+    <cs:effectRef idx="0"/>
+    <cs:fontRef idx="minor">
+      <a:schemeClr val="tx1"/>
+    </cs:fontRef>
+    <cs:spPr>
+      <a:ln w="9525" cap="flat" cmpd="sng" algn="ctr">
+        <a:solidFill>
+          <a:schemeClr val="tx1">
+            <a:lumMod val="75000"/>
+            <a:lumOff val="25000"/>
+          </a:schemeClr>
+        </a:solidFill>
+        <a:round/>
+      </a:ln>
+    </cs:spPr>
+  </cs:hiLoLine>
+  <cs:leaderLine>
+    <cs:lnRef idx="0"/>
+    <cs:fillRef idx="0"/>
+    <cs:effectRef idx="0"/>
+    <cs:fontRef idx="minor">
+      <a:schemeClr val="tx1"/>
+    </cs:fontRef>
+    <cs:spPr>
+      <a:ln w="9525" cap="flat" cmpd="sng" algn="ctr">
+        <a:solidFill>
+          <a:schemeClr val="tx1">
+            <a:lumMod val="35000"/>
+            <a:lumOff val="65000"/>
+          </a:schemeClr>
+        </a:solidFill>
+        <a:round/>
+      </a:ln>
+    </cs:spPr>
+  </cs:leaderLine>
+  <cs:legend>
+    <cs:lnRef idx="0"/>
+    <cs:fillRef idx="0"/>
+    <cs:effectRef idx="0"/>
+    <cs:fontRef idx="minor">
+      <a:schemeClr val="tx1">
+        <a:lumMod val="65000"/>
+        <a:lumOff val="35000"/>
+      </a:schemeClr>
+    </cs:fontRef>
+    <cs:defRPr sz="1197" kern="1200"/>
+  </cs:legend>
+  <cs:plotArea mods="allowNoFillOverride allowNoLineOverride">
+    <cs:lnRef idx="0"/>
+    <cs:fillRef idx="0"/>
+    <cs:effectRef idx="0"/>
+    <cs:fontRef idx="minor">
+      <a:schemeClr val="tx1"/>
+    </cs:fontRef>
+  </cs:plotArea>
+  <cs:plotArea3D mods="allowNoFillOverride allowNoLineOverride">
+    <cs:lnRef idx="0"/>
+    <cs:fillRef idx="0"/>
+    <cs:effectRef idx="0"/>
+    <cs:fontRef idx="minor">
+      <a:schemeClr val="tx1"/>
+    </cs:fontRef>
+  </cs:plotArea3D>
+  <cs:seriesAxis>
+    <cs:lnRef idx="0"/>
+    <cs:fillRef idx="0"/>
+    <cs:effectRef idx="0"/>
+    <cs:fontRef idx="minor">
+      <a:schemeClr val="tx1">
+        <a:lumMod val="65000"/>
+        <a:lumOff val="35000"/>
+      </a:schemeClr>
+    </cs:fontRef>
+    <cs:defRPr sz="1197" kern="1200"/>
+  </cs:seriesAxis>
+  <cs:seriesLine>
+    <cs:lnRef idx="0"/>
+    <cs:fillRef idx="0"/>
+    <cs:effectRef idx="0"/>
+    <cs:fontRef idx="minor">
+      <a:schemeClr val="tx1"/>
+    </cs:fontRef>
+    <cs:spPr>
+      <a:ln w="9525" cap="flat" cmpd="sng" algn="ctr">
+        <a:solidFill>
+          <a:schemeClr val="tx1">
+            <a:lumMod val="35000"/>
+            <a:lumOff val="65000"/>
+          </a:schemeClr>
+        </a:solidFill>
+        <a:round/>
+      </a:ln>
+    </cs:spPr>
+  </cs:seriesLine>
+  <cs:title>
+    <cs:lnRef idx="0"/>
+    <cs:fillRef idx="0"/>
+    <cs:effectRef idx="0"/>
+    <cs:fontRef idx="minor">
+      <a:schemeClr val="tx1">
+        <a:lumMod val="65000"/>
+        <a:lumOff val="35000"/>
+      </a:schemeClr>
+    </cs:fontRef>
+    <cs:defRPr sz="1862" b="0" kern="1200" spc="0" baseline="0"/>
+  </cs:title>
+  <cs:trendline>
+    <cs:lnRef idx="0">
+      <cs:styleClr val="auto"/>
+    </cs:lnRef>
+    <cs:fillRef idx="0"/>
+    <cs:effectRef idx="0"/>
+    <cs:fontRef idx="minor">
+      <a:schemeClr val="tx1"/>
+    </cs:fontRef>
+    <cs:spPr>
+      <a:ln w="19050" cap="rnd">
+        <a:solidFill>
+          <a:schemeClr val="phClr"/>
+        </a:solidFill>
+        <a:prstDash val="sysDot"/>
+      </a:ln>
+    </cs:spPr>
+  </cs:trendline>
+  <cs:trendlineLabel>
+    <cs:lnRef idx="0"/>
+    <cs:fillRef idx="0"/>
+    <cs:effectRef idx="0"/>
+    <cs:fontRef idx="minor">
+      <a:schemeClr val="tx1">
+        <a:lumMod val="65000"/>
+        <a:lumOff val="35000"/>
+      </a:schemeClr>
+    </cs:fontRef>
+    <cs:defRPr sz="1197" kern="1200"/>
+  </cs:trendlineLabel>
+  <cs:upBar>
+    <cs:lnRef idx="0"/>
+    <cs:fillRef idx="0"/>
+    <cs:effectRef idx="0"/>
+    <cs:fontRef idx="minor">
+      <a:schemeClr val="dk1"/>
+    </cs:fontRef>
+    <cs:spPr>
+      <a:solidFill>
+        <a:schemeClr val="lt1"/>
+      </a:solidFill>
+      <a:ln w="9525">
+        <a:solidFill>
+          <a:schemeClr val="tx1">
+            <a:lumMod val="15000"/>
+            <a:lumOff val="85000"/>
+          </a:schemeClr>
+        </a:solidFill>
+      </a:ln>
+    </cs:spPr>
+  </cs:upBar>
+  <cs:valueAxis>
+    <cs:lnRef idx="0"/>
+    <cs:fillRef idx="0"/>
+    <cs:effectRef idx="0"/>
+    <cs:fontRef idx="minor">
+      <a:schemeClr val="tx1">
+        <a:lumMod val="65000"/>
+        <a:lumOff val="35000"/>
+      </a:schemeClr>
+    </cs:fontRef>
+    <cs:defRPr sz="1197" kern="1200"/>
+  </cs:valueAxis>
+  <cs:wall>
+    <cs:lnRef idx="0"/>
+    <cs:fillRef idx="0"/>
+    <cs:effectRef idx="0"/>
+    <cs:fontRef idx="minor">
+      <a:schemeClr val="tx1"/>
+    </cs:fontRef>
+    <cs:spPr>
+      <a:noFill/>
+      <a:ln>
+        <a:noFill/>
+      </a:ln>
+    </cs:spPr>
+  </cs:wall>
+</cs:chartStyle>
+</file>
+
+<file path=ppt/charts/style7.xml><?xml version="1.0" encoding="utf-8"?>
+<cs:chartStyle xmlns:cs="http://schemas.microsoft.com/office/drawing/2012/chartStyle" xmlns:a="http://schemas.openxmlformats.org/drawingml/2006/main" id="227">
+  <cs:axisTitle>
+    <cs:lnRef idx="0"/>
+    <cs:fillRef idx="0"/>
+    <cs:effectRef idx="0"/>
+    <cs:fontRef idx="minor">
+      <a:schemeClr val="tx1">
+        <a:lumMod val="65000"/>
+        <a:lumOff val="35000"/>
+      </a:schemeClr>
+    </cs:fontRef>
+    <cs:defRPr sz="1330" kern="1200"/>
+  </cs:axisTitle>
+  <cs:categoryAxis>
+    <cs:lnRef idx="0"/>
+    <cs:fillRef idx="0"/>
+    <cs:effectRef idx="0"/>
+    <cs:fontRef idx="minor">
+      <a:schemeClr val="tx1">
+        <a:lumMod val="65000"/>
+        <a:lumOff val="35000"/>
+      </a:schemeClr>
+    </cs:fontRef>
+    <cs:spPr>
+      <a:ln w="9525" cap="flat" cmpd="sng" algn="ctr">
+        <a:solidFill>
+          <a:schemeClr val="tx1">
+            <a:lumMod val="15000"/>
+            <a:lumOff val="85000"/>
+          </a:schemeClr>
+        </a:solidFill>
+        <a:round/>
+      </a:ln>
+    </cs:spPr>
+    <cs:defRPr sz="1197" kern="1200"/>
+  </cs:categoryAxis>
+  <cs:chartArea mods="allowNoFillOverride allowNoLineOverride">
+    <cs:lnRef idx="0"/>
+    <cs:fillRef idx="0"/>
+    <cs:effectRef idx="0"/>
+    <cs:fontRef idx="minor">
+      <a:schemeClr val="tx1"/>
+    </cs:fontRef>
+    <cs:spPr>
+      <a:solidFill>
+        <a:schemeClr val="bg1"/>
+      </a:solidFill>
+      <a:ln w="9525" cap="flat" cmpd="sng" algn="ctr">
+        <a:solidFill>
+          <a:schemeClr val="tx1">
+            <a:lumMod val="15000"/>
+            <a:lumOff val="85000"/>
+          </a:schemeClr>
+        </a:solidFill>
+        <a:round/>
+      </a:ln>
+    </cs:spPr>
+    <cs:defRPr sz="1330" kern="1200"/>
+  </cs:chartArea>
+  <cs:dataLabel>
+    <cs:lnRef idx="0"/>
+    <cs:fillRef idx="0"/>
+    <cs:effectRef idx="0"/>
+    <cs:fontRef idx="minor">
+      <a:schemeClr val="tx1">
+        <a:lumMod val="75000"/>
+        <a:lumOff val="25000"/>
+      </a:schemeClr>
+    </cs:fontRef>
+    <cs:defRPr sz="1197" kern="1200"/>
+  </cs:dataLabel>
+  <cs:dataLabelCallout>
+    <cs:lnRef idx="0"/>
+    <cs:fillRef idx="0"/>
+    <cs:effectRef idx="0"/>
+    <cs:fontRef idx="minor">
+      <a:schemeClr val="dk1">
+        <a:lumMod val="65000"/>
+        <a:lumOff val="35000"/>
+      </a:schemeClr>
+    </cs:fontRef>
+    <cs:spPr>
+      <a:solidFill>
+        <a:schemeClr val="lt1"/>
+      </a:solidFill>
+      <a:ln>
+        <a:solidFill>
+          <a:schemeClr val="dk1">
+            <a:lumMod val="25000"/>
+            <a:lumOff val="75000"/>
+          </a:schemeClr>
+        </a:solidFill>
+      </a:ln>
+    </cs:spPr>
+    <cs:defRPr sz="1197" kern="1200"/>
+    <cs:bodyPr rot="0" spcFirstLastPara="1" vertOverflow="clip" horzOverflow="clip" vert="horz" wrap="square" lIns="36576" tIns="18288" rIns="36576" bIns="18288" anchor="ctr" anchorCtr="1">
+      <a:spAutoFit/>
+    </cs:bodyPr>
+  </cs:dataLabelCallout>
+  <cs:dataPoint>
+    <cs:lnRef idx="0"/>
+    <cs:fillRef idx="1">
+      <cs:styleClr val="auto"/>
+    </cs:fillRef>
+    <cs:effectRef idx="0"/>
+    <cs:fontRef idx="minor">
+      <a:schemeClr val="tx1"/>
+    </cs:fontRef>
+    <cs:spPr>
+      <a:solidFill>
+        <a:schemeClr val="phClr"/>
+      </a:solidFill>
+    </cs:spPr>
+  </cs:dataPoint>
+  <cs:dataPoint3D>
+    <cs:lnRef idx="0"/>
+    <cs:fillRef idx="1">
+      <cs:styleClr val="auto"/>
+    </cs:fillRef>
+    <cs:effectRef idx="0"/>
+    <cs:fontRef idx="minor">
+      <a:schemeClr val="tx1"/>
+    </cs:fontRef>
+    <cs:spPr>
+      <a:solidFill>
+        <a:schemeClr val="phClr"/>
+      </a:solidFill>
+    </cs:spPr>
+  </cs:dataPoint3D>
+  <cs:dataPointLine>
+    <cs:lnRef idx="0">
+      <cs:styleClr val="auto"/>
+    </cs:lnRef>
+    <cs:fillRef idx="1"/>
+    <cs:effectRef idx="0"/>
+    <cs:fontRef idx="minor">
+      <a:schemeClr val="tx1"/>
+    </cs:fontRef>
+    <cs:spPr>
+      <a:ln w="28575" cap="rnd">
+        <a:solidFill>
+          <a:schemeClr val="phClr"/>
+        </a:solidFill>
+        <a:round/>
+      </a:ln>
+    </cs:spPr>
+  </cs:dataPointLine>
+  <cs:dataPointMarker>
+    <cs:lnRef idx="0">
+      <cs:styleClr val="auto"/>
+    </cs:lnRef>
+    <cs:fillRef idx="1">
+      <cs:styleClr val="auto"/>
+    </cs:fillRef>
+    <cs:effectRef idx="0"/>
+    <cs:fontRef idx="minor">
+      <a:schemeClr val="tx1"/>
+    </cs:fontRef>
+    <cs:spPr>
+      <a:solidFill>
+        <a:schemeClr val="phClr"/>
+      </a:solidFill>
       <a:ln w="9525">
         <a:solidFill>
           <a:schemeClr val="phClr"/>
@@ -6289,7 +7335,7 @@
               <a:rPr lang="en-US" smtClean="0">
                 <a:latin typeface="Arial" panose="020B0604020202020204" pitchFamily="34" charset="0"/>
               </a:rPr>
-              <a:t>6/23/2021</a:t>
+              <a:t>8/13/2021</a:t>
             </a:fld>
             <a:endParaRPr lang="en-US" dirty="0">
               <a:latin typeface="Arial" panose="020B0604020202020204" pitchFamily="34" charset="0"/>
@@ -6468,7 +7514,7 @@
             <a:fld id="{0BA5BBE4-AEA3-489A-A28E-0C2FAF2506E3}" type="datetimeFigureOut">
               <a:rPr lang="en-US" smtClean="0"/>
               <a:pPr/>
-              <a:t>6/23/2021</a:t>
+              <a:t>8/13/2021</a:t>
             </a:fld>
             <a:endParaRPr lang="en-US" dirty="0"/>
           </a:p>
@@ -7905,7 +8951,7 @@
         <p:fade/>
       </p:transition>
     </mc:Choice>
-    <mc:Fallback xmlns:v="urn:schemas-microsoft-com:vml" xmlns:c="http://schemas.openxmlformats.org/drawingml/2006/chart" xmlns="">
+    <mc:Fallback xmlns="" xmlns:c="http://schemas.openxmlformats.org/drawingml/2006/chart" xmlns:v="urn:schemas-microsoft-com:vml">
       <p:transition spd="med">
         <p:fade/>
       </p:transition>
@@ -8321,6 +9367,67 @@
 </p:sld>
 </file>
 
+<file path=ppt/slides/slide4.xml><?xml version="1.0" encoding="utf-8"?>
+<p:sld xmlns:a="http://schemas.openxmlformats.org/drawingml/2006/main" xmlns:r="http://schemas.openxmlformats.org/officeDocument/2006/relationships" xmlns:p="http://schemas.openxmlformats.org/presentationml/2006/main">
+  <p:cSld>
+    <p:spTree>
+      <p:nvGrpSpPr>
+        <p:cNvPr id="1" name=""/>
+        <p:cNvGrpSpPr/>
+        <p:nvPr/>
+      </p:nvGrpSpPr>
+      <p:grpSpPr>
+        <a:xfrm>
+          <a:off x="0" y="0"/>
+          <a:ext cx="0" cy="0"/>
+          <a:chOff x="0" y="0"/>
+          <a:chExt cx="0" cy="0"/>
+        </a:xfrm>
+      </p:grpSpPr>
+      <p:graphicFrame>
+        <p:nvGraphicFramePr>
+          <p:cNvPr id="13" name="Chart 12">
+            <a:extLst>
+              <a:ext uri="{FF2B5EF4-FFF2-40B4-BE49-F238E27FC236}">
+                <a16:creationId xmlns:a16="http://schemas.microsoft.com/office/drawing/2014/main" id="{796A9461-0D90-48F3-92EA-D3DC5F7647F4}"/>
+              </a:ext>
+            </a:extLst>
+          </p:cNvPr>
+          <p:cNvGraphicFramePr/>
+          <p:nvPr>
+            <p:extLst>
+              <p:ext uri="{D42A27DB-BD31-4B8C-83A1-F6EECF244321}">
+                <p14:modId xmlns:p14="http://schemas.microsoft.com/office/powerpoint/2010/main" val="1161321540"/>
+              </p:ext>
+            </p:extLst>
+          </p:nvPr>
+        </p:nvGraphicFramePr>
+        <p:xfrm>
+          <a:off x="543888" y="165798"/>
+          <a:ext cx="6132042" cy="3750748"/>
+        </p:xfrm>
+        <a:graphic>
+          <a:graphicData uri="http://schemas.openxmlformats.org/drawingml/2006/chart">
+            <c:chart xmlns:c="http://schemas.openxmlformats.org/drawingml/2006/chart" xmlns:r="http://schemas.openxmlformats.org/officeDocument/2006/relationships" r:id="rId2"/>
+          </a:graphicData>
+        </a:graphic>
+      </p:graphicFrame>
+    </p:spTree>
+    <p:extLst>
+      <p:ext uri="{BB962C8B-B14F-4D97-AF65-F5344CB8AC3E}">
+        <p14:creationId xmlns:p14="http://schemas.microsoft.com/office/powerpoint/2010/main" val="2749156856"/>
+      </p:ext>
+    </p:extLst>
+  </p:cSld>
+  <p:clrMapOvr>
+    <a:masterClrMapping/>
+  </p:clrMapOvr>
+  <p:transition>
+    <p:fade/>
+  </p:transition>
+</p:sld>
+</file>
+
 <file path=ppt/tags/tag1.xml><?xml version="1.0" encoding="utf-8"?>
 <p:tagLst xmlns:a="http://schemas.openxmlformats.org/drawingml/2006/main" xmlns:r="http://schemas.openxmlformats.org/officeDocument/2006/relationships" xmlns:p="http://schemas.openxmlformats.org/presentationml/2006/main">
   <p:tag name="THINKCELLUNDODONOTDELETE" val="0"/>

</xml_diff>

<commit_message>
SC-66: Update chart series processing
</commit_message>
<xml_diff>
--- a/ShapeCrawler.Tests.Unit/Resource/025_chart.pptx
+++ b/ShapeCrawler.Tests.Unit/Resource/025_chart.pptx
@@ -592,6 +592,36 @@
   </mc:AlternateContent>
   <c:chart>
     <c:title>
+      <c:tx>
+        <c:rich>
+          <a:bodyPr rot="0" spcFirstLastPara="1" vertOverflow="ellipsis" vert="horz" wrap="square" anchor="ctr" anchorCtr="1"/>
+          <a:lstStyle/>
+          <a:p>
+            <a:pPr>
+              <a:defRPr sz="1862" b="0" i="0" u="none" strike="noStrike" kern="1200" spc="0" baseline="0">
+                <a:solidFill>
+                  <a:schemeClr val="tx1">
+                    <a:lumMod val="65000"/>
+                    <a:lumOff val="35000"/>
+                  </a:schemeClr>
+                </a:solidFill>
+                <a:latin typeface="+mn-lt"/>
+                <a:ea typeface="+mn-ea"/>
+                <a:cs typeface="+mn-cs"/>
+              </a:defRPr>
+            </a:pPr>
+            <a:r>
+              <a:rPr lang="en-US" dirty="0"/>
+              <a:t>Chart Title_id5</a:t>
+            </a:r>
+            <a:r>
+              <a:rPr lang="en-US"/>
+              <a:t>_chart3</a:t>
+            </a:r>
+            <a:endParaRPr lang="en-US" dirty="0"/>
+          </a:p>
+        </c:rich>
+      </c:tx>
       <c:overlay val="0"/>
       <c:spPr>
         <a:noFill/>
@@ -652,6 +682,64 @@
             <a:effectLst/>
           </c:spPr>
           <c:invertIfNegative val="0"/>
+          <c:dLbls>
+            <c:spPr>
+              <a:noFill/>
+              <a:ln>
+                <a:noFill/>
+              </a:ln>
+              <a:effectLst/>
+            </c:spPr>
+            <c:txPr>
+              <a:bodyPr rot="0" spcFirstLastPara="1" vertOverflow="ellipsis" vert="horz" wrap="square" lIns="38100" tIns="19050" rIns="38100" bIns="19050" anchor="ctr" anchorCtr="1">
+                <a:spAutoFit/>
+              </a:bodyPr>
+              <a:lstStyle/>
+              <a:p>
+                <a:pPr>
+                  <a:defRPr sz="1197" b="0" i="0" u="none" strike="noStrike" kern="1200" baseline="0">
+                    <a:solidFill>
+                      <a:schemeClr val="tx1">
+                        <a:lumMod val="75000"/>
+                        <a:lumOff val="25000"/>
+                      </a:schemeClr>
+                    </a:solidFill>
+                    <a:latin typeface="+mn-lt"/>
+                    <a:ea typeface="+mn-ea"/>
+                    <a:cs typeface="+mn-cs"/>
+                  </a:defRPr>
+                </a:pPr>
+                <a:endParaRPr lang="en-US"/>
+              </a:p>
+            </c:txPr>
+            <c:dLblPos val="outEnd"/>
+            <c:showLegendKey val="0"/>
+            <c:showVal val="1"/>
+            <c:showCatName val="0"/>
+            <c:showSerName val="0"/>
+            <c:showPercent val="0"/>
+            <c:showBubbleSize val="0"/>
+            <c:showLeaderLines val="0"/>
+            <c:extLst>
+              <c:ext xmlns:c15="http://schemas.microsoft.com/office/drawing/2012/chart" uri="{CE6537A1-D6FC-4f65-9D91-7224C49458BB}">
+                <c15:showLeaderLines val="1"/>
+                <c15:leaderLines>
+                  <c:spPr>
+                    <a:ln w="9525" cap="flat" cmpd="sng" algn="ctr">
+                      <a:solidFill>
+                        <a:schemeClr val="tx1">
+                          <a:lumMod val="35000"/>
+                          <a:lumOff val="65000"/>
+                        </a:schemeClr>
+                      </a:solidFill>
+                      <a:round/>
+                    </a:ln>
+                    <a:effectLst/>
+                  </c:spPr>
+                </c15:leaderLines>
+              </c:ext>
+            </c:extLst>
+          </c:dLbls>
           <c:cat>
             <c:strRef>
               <c:f>Лист1!$A$2:$A$5</c:f>
@@ -723,6 +811,64 @@
             <a:effectLst/>
           </c:spPr>
           <c:invertIfNegative val="0"/>
+          <c:dLbls>
+            <c:spPr>
+              <a:noFill/>
+              <a:ln>
+                <a:noFill/>
+              </a:ln>
+              <a:effectLst/>
+            </c:spPr>
+            <c:txPr>
+              <a:bodyPr rot="0" spcFirstLastPara="1" vertOverflow="ellipsis" vert="horz" wrap="square" lIns="38100" tIns="19050" rIns="38100" bIns="19050" anchor="ctr" anchorCtr="1">
+                <a:spAutoFit/>
+              </a:bodyPr>
+              <a:lstStyle/>
+              <a:p>
+                <a:pPr>
+                  <a:defRPr sz="1197" b="0" i="0" u="none" strike="noStrike" kern="1200" baseline="0">
+                    <a:solidFill>
+                      <a:schemeClr val="tx1">
+                        <a:lumMod val="75000"/>
+                        <a:lumOff val="25000"/>
+                      </a:schemeClr>
+                    </a:solidFill>
+                    <a:latin typeface="+mn-lt"/>
+                    <a:ea typeface="+mn-ea"/>
+                    <a:cs typeface="+mn-cs"/>
+                  </a:defRPr>
+                </a:pPr>
+                <a:endParaRPr lang="en-US"/>
+              </a:p>
+            </c:txPr>
+            <c:dLblPos val="outEnd"/>
+            <c:showLegendKey val="0"/>
+            <c:showVal val="1"/>
+            <c:showCatName val="0"/>
+            <c:showSerName val="0"/>
+            <c:showPercent val="0"/>
+            <c:showBubbleSize val="0"/>
+            <c:showLeaderLines val="0"/>
+            <c:extLst>
+              <c:ext xmlns:c15="http://schemas.microsoft.com/office/drawing/2012/chart" uri="{CE6537A1-D6FC-4f65-9D91-7224C49458BB}">
+                <c15:showLeaderLines val="1"/>
+                <c15:leaderLines>
+                  <c:spPr>
+                    <a:ln w="9525" cap="flat" cmpd="sng" algn="ctr">
+                      <a:solidFill>
+                        <a:schemeClr val="tx1">
+                          <a:lumMod val="35000"/>
+                          <a:lumOff val="65000"/>
+                        </a:schemeClr>
+                      </a:solidFill>
+                      <a:round/>
+                    </a:ln>
+                    <a:effectLst/>
+                  </c:spPr>
+                </c15:leaderLines>
+              </c:ext>
+            </c:extLst>
+          </c:dLbls>
           <c:cat>
             <c:strRef>
               <c:f>Лист1!$A$2:$A$5</c:f>
@@ -794,6 +940,64 @@
             <a:effectLst/>
           </c:spPr>
           <c:invertIfNegative val="0"/>
+          <c:dLbls>
+            <c:spPr>
+              <a:noFill/>
+              <a:ln>
+                <a:noFill/>
+              </a:ln>
+              <a:effectLst/>
+            </c:spPr>
+            <c:txPr>
+              <a:bodyPr rot="0" spcFirstLastPara="1" vertOverflow="ellipsis" vert="horz" wrap="square" lIns="38100" tIns="19050" rIns="38100" bIns="19050" anchor="ctr" anchorCtr="1">
+                <a:spAutoFit/>
+              </a:bodyPr>
+              <a:lstStyle/>
+              <a:p>
+                <a:pPr>
+                  <a:defRPr sz="1197" b="0" i="0" u="none" strike="noStrike" kern="1200" baseline="0">
+                    <a:solidFill>
+                      <a:schemeClr val="tx1">
+                        <a:lumMod val="75000"/>
+                        <a:lumOff val="25000"/>
+                      </a:schemeClr>
+                    </a:solidFill>
+                    <a:latin typeface="+mn-lt"/>
+                    <a:ea typeface="+mn-ea"/>
+                    <a:cs typeface="+mn-cs"/>
+                  </a:defRPr>
+                </a:pPr>
+                <a:endParaRPr lang="en-US"/>
+              </a:p>
+            </c:txPr>
+            <c:dLblPos val="outEnd"/>
+            <c:showLegendKey val="0"/>
+            <c:showVal val="1"/>
+            <c:showCatName val="0"/>
+            <c:showSerName val="0"/>
+            <c:showPercent val="0"/>
+            <c:showBubbleSize val="0"/>
+            <c:showLeaderLines val="0"/>
+            <c:extLst>
+              <c:ext xmlns:c15="http://schemas.microsoft.com/office/drawing/2012/chart" uri="{CE6537A1-D6FC-4f65-9D91-7224C49458BB}">
+                <c15:showLeaderLines val="1"/>
+                <c15:leaderLines>
+                  <c:spPr>
+                    <a:ln w="9525" cap="flat" cmpd="sng" algn="ctr">
+                      <a:solidFill>
+                        <a:schemeClr val="tx1">
+                          <a:lumMod val="35000"/>
+                          <a:lumOff val="65000"/>
+                        </a:schemeClr>
+                      </a:solidFill>
+                      <a:round/>
+                    </a:ln>
+                    <a:effectLst/>
+                  </c:spPr>
+                </c15:leaderLines>
+              </c:ext>
+            </c:extLst>
+          </c:dLbls>
           <c:cat>
             <c:strRef>
               <c:f>Лист1!$A$2:$A$5</c:f>
@@ -842,8 +1046,9 @@
           </c:extLst>
         </c:ser>
         <c:dLbls>
+          <c:dLblPos val="outEnd"/>
           <c:showLegendKey val="0"/>
-          <c:showVal val="0"/>
+          <c:showVal val="1"/>
           <c:showCatName val="0"/>
           <c:showSerName val="0"/>
           <c:showPercent val="0"/>
@@ -1187,7 +1392,7 @@
               </c:numCache>
             </c:numRef>
           </c:val>
-          <c:extLst xmlns:c16r3="http://schemas.microsoft.com/office/drawing/2017/03/chart" xmlns:c16="http://schemas.microsoft.com/office/drawing/2014/chart" xmlns:c14="http://schemas.microsoft.com/office/drawing/2007/8/2/chart" xmlns:mc="http://schemas.openxmlformats.org/markup-compatibility/2006">
+          <c:extLst xmlns:mc="http://schemas.openxmlformats.org/markup-compatibility/2006" xmlns:c14="http://schemas.microsoft.com/office/drawing/2007/8/2/chart" xmlns:c16="http://schemas.microsoft.com/office/drawing/2014/chart" xmlns:c16r3="http://schemas.microsoft.com/office/drawing/2017/03/chart">
             <c:ext xmlns:c16="http://schemas.microsoft.com/office/drawing/2014/chart" uri="{C3380CC4-5D6E-409C-BE32-E72D297353CC}">
               <c16:uniqueId val="{00000004-85FF-4A9E-A301-DA0EAA17C6A6}"/>
             </c:ext>
@@ -1272,7 +1477,7 @@
               </c:numCache>
             </c:numRef>
           </c:val>
-          <c:extLst xmlns:c16r3="http://schemas.microsoft.com/office/drawing/2017/03/chart" xmlns:c16="http://schemas.microsoft.com/office/drawing/2014/chart" xmlns:c14="http://schemas.microsoft.com/office/drawing/2007/8/2/chart" xmlns:mc="http://schemas.openxmlformats.org/markup-compatibility/2006">
+          <c:extLst xmlns:mc="http://schemas.openxmlformats.org/markup-compatibility/2006" xmlns:c14="http://schemas.microsoft.com/office/drawing/2007/8/2/chart" xmlns:c16="http://schemas.microsoft.com/office/drawing/2014/chart" xmlns:c16r3="http://schemas.microsoft.com/office/drawing/2017/03/chart">
             <c:ext xmlns:c16="http://schemas.microsoft.com/office/drawing/2014/chart" uri="{C3380CC4-5D6E-409C-BE32-E72D297353CC}">
               <c16:uniqueId val="{00000009-85FF-4A9E-A301-DA0EAA17C6A6}"/>
             </c:ext>
@@ -1362,7 +1567,7 @@
               </c:numCache>
             </c:numRef>
           </c:val>
-          <c:extLst xmlns:c16r3="http://schemas.microsoft.com/office/drawing/2017/03/chart" xmlns:c16="http://schemas.microsoft.com/office/drawing/2014/chart" xmlns:c14="http://schemas.microsoft.com/office/drawing/2007/8/2/chart" xmlns:mc="http://schemas.openxmlformats.org/markup-compatibility/2006">
+          <c:extLst xmlns:mc="http://schemas.openxmlformats.org/markup-compatibility/2006" xmlns:c14="http://schemas.microsoft.com/office/drawing/2007/8/2/chart" xmlns:c16="http://schemas.microsoft.com/office/drawing/2014/chart" xmlns:c16r3="http://schemas.microsoft.com/office/drawing/2017/03/chart">
             <c:ext xmlns:c16="http://schemas.microsoft.com/office/drawing/2014/chart" uri="{C3380CC4-5D6E-409C-BE32-E72D297353CC}">
               <c16:uniqueId val="{0000000E-85FF-4A9E-A301-DA0EAA17C6A6}"/>
             </c:ext>
@@ -1447,7 +1652,7 @@
               </c:numCache>
             </c:numRef>
           </c:val>
-          <c:extLst xmlns:c16r3="http://schemas.microsoft.com/office/drawing/2017/03/chart" xmlns:c16="http://schemas.microsoft.com/office/drawing/2014/chart" xmlns:c14="http://schemas.microsoft.com/office/drawing/2007/8/2/chart" xmlns:mc="http://schemas.openxmlformats.org/markup-compatibility/2006">
+          <c:extLst xmlns:mc="http://schemas.openxmlformats.org/markup-compatibility/2006" xmlns:c14="http://schemas.microsoft.com/office/drawing/2007/8/2/chart" xmlns:c16="http://schemas.microsoft.com/office/drawing/2014/chart" xmlns:c16r3="http://schemas.microsoft.com/office/drawing/2017/03/chart">
             <c:ext xmlns:c16="http://schemas.microsoft.com/office/drawing/2014/chart" uri="{C3380CC4-5D6E-409C-BE32-E72D297353CC}">
               <c16:uniqueId val="{00000013-85FF-4A9E-A301-DA0EAA17C6A6}"/>
             </c:ext>
@@ -1505,7 +1710,7 @@
     </c:legend>
     <c:plotVisOnly val="1"/>
     <c:dispBlanksAs val="gap"/>
-    <c:extLst xmlns:c16r3="http://schemas.microsoft.com/office/drawing/2017/03/chart" xmlns:c16="http://schemas.microsoft.com/office/drawing/2014/chart" xmlns:c14="http://schemas.microsoft.com/office/drawing/2007/8/2/chart" xmlns:mc="http://schemas.openxmlformats.org/markup-compatibility/2006">
+    <c:extLst xmlns:mc="http://schemas.openxmlformats.org/markup-compatibility/2006" xmlns:c14="http://schemas.microsoft.com/office/drawing/2007/8/2/chart" xmlns:c16="http://schemas.microsoft.com/office/drawing/2014/chart" xmlns:c16r3="http://schemas.microsoft.com/office/drawing/2017/03/chart">
       <c:ext xmlns:c16r3="http://schemas.microsoft.com/office/drawing/2017/03/chart" uri="{56B9EC1D-385E-4148-901F-78D8002777C0}">
         <c16r3:dataDisplayOptions16>
           <c16r3:dispNaAsBlank val="1"/>
@@ -1651,7 +1856,7 @@
             </c:numRef>
           </c:yVal>
           <c:smooth val="1"/>
-          <c:extLst xmlns:mc="http://schemas.openxmlformats.org/markup-compatibility/2006" xmlns:c14="http://schemas.microsoft.com/office/drawing/2007/8/2/chart" xmlns:c16="http://schemas.microsoft.com/office/drawing/2014/chart">
+          <c:extLst xmlns:c16="http://schemas.microsoft.com/office/drawing/2014/chart" xmlns:c14="http://schemas.microsoft.com/office/drawing/2007/8/2/chart" xmlns:mc="http://schemas.openxmlformats.org/markup-compatibility/2006">
             <c:ext xmlns:c16="http://schemas.microsoft.com/office/drawing/2014/chart" uri="{C3380CC4-5D6E-409C-BE32-E72D297353CC}">
               <c16:uniqueId val="{00000000-9B82-4F0A-BBF2-F487496F06C9}"/>
             </c:ext>
@@ -1738,7 +1943,7 @@
             </c:numRef>
           </c:yVal>
           <c:smooth val="1"/>
-          <c:extLst xmlns:mc="http://schemas.openxmlformats.org/markup-compatibility/2006" xmlns:c14="http://schemas.microsoft.com/office/drawing/2007/8/2/chart" xmlns:c16="http://schemas.microsoft.com/office/drawing/2014/chart">
+          <c:extLst xmlns:c16="http://schemas.microsoft.com/office/drawing/2014/chart" xmlns:c14="http://schemas.microsoft.com/office/drawing/2007/8/2/chart" xmlns:mc="http://schemas.openxmlformats.org/markup-compatibility/2006">
             <c:ext xmlns:c16="http://schemas.microsoft.com/office/drawing/2014/chart" uri="{C3380CC4-5D6E-409C-BE32-E72D297353CC}">
               <c16:uniqueId val="{00000001-9B82-4F0A-BBF2-F487496F06C9}"/>
             </c:ext>
@@ -1825,7 +2030,7 @@
             </c:numRef>
           </c:yVal>
           <c:smooth val="1"/>
-          <c:extLst xmlns:mc="http://schemas.openxmlformats.org/markup-compatibility/2006" xmlns:c14="http://schemas.microsoft.com/office/drawing/2007/8/2/chart" xmlns:c16="http://schemas.microsoft.com/office/drawing/2014/chart">
+          <c:extLst xmlns:c16="http://schemas.microsoft.com/office/drawing/2014/chart" xmlns:c14="http://schemas.microsoft.com/office/drawing/2007/8/2/chart" xmlns:mc="http://schemas.openxmlformats.org/markup-compatibility/2006">
             <c:ext xmlns:c16="http://schemas.microsoft.com/office/drawing/2014/chart" uri="{C3380CC4-5D6E-409C-BE32-E72D297353CC}">
               <c16:uniqueId val="{00000002-9B82-4F0A-BBF2-F487496F06C9}"/>
             </c:ext>
@@ -2099,7 +2304,7 @@
               <c:showSerName val="0"/>
               <c:showPercent val="0"/>
               <c:showBubbleSize val="0"/>
-              <c:extLst xmlns:c16="http://schemas.microsoft.com/office/drawing/2014/chart" xmlns:c15="http://schemas.microsoft.com/office/drawing/2012/chart" xmlns:c14="http://schemas.microsoft.com/office/drawing/2007/8/2/chart" xmlns:mc="http://schemas.openxmlformats.org/markup-compatibility/2006">
+              <c:extLst xmlns:mc="http://schemas.openxmlformats.org/markup-compatibility/2006" xmlns:c14="http://schemas.microsoft.com/office/drawing/2007/8/2/chart" xmlns:c15="http://schemas.microsoft.com/office/drawing/2012/chart" xmlns:c16="http://schemas.microsoft.com/office/drawing/2014/chart">
                 <c:ext xmlns:c15="http://schemas.microsoft.com/office/drawing/2012/chart" uri="{CE6537A1-D6FC-4f65-9D91-7224C49458BB}">
                   <c15:dlblFieldTable/>
                   <c15:showDataLabelsRange val="0"/>
@@ -2189,7 +2394,7 @@
               <c:showSerName val="0"/>
               <c:showPercent val="0"/>
               <c:showBubbleSize val="0"/>
-              <c:extLst xmlns:c16="http://schemas.microsoft.com/office/drawing/2014/chart" xmlns:c15="http://schemas.microsoft.com/office/drawing/2012/chart" xmlns:c14="http://schemas.microsoft.com/office/drawing/2007/8/2/chart" xmlns:mc="http://schemas.openxmlformats.org/markup-compatibility/2006">
+              <c:extLst xmlns:mc="http://schemas.openxmlformats.org/markup-compatibility/2006" xmlns:c14="http://schemas.microsoft.com/office/drawing/2007/8/2/chart" xmlns:c15="http://schemas.microsoft.com/office/drawing/2012/chart" xmlns:c16="http://schemas.microsoft.com/office/drawing/2014/chart">
                 <c:ext xmlns:c15="http://schemas.microsoft.com/office/drawing/2012/chart" uri="{CE6537A1-D6FC-4f65-9D91-7224C49458BB}">
                   <c15:layout>
                     <c:manualLayout>
@@ -2293,7 +2498,7 @@
               <c:showSerName val="0"/>
               <c:showPercent val="0"/>
               <c:showBubbleSize val="0"/>
-              <c:extLst xmlns:c16="http://schemas.microsoft.com/office/drawing/2014/chart" xmlns:c15="http://schemas.microsoft.com/office/drawing/2012/chart" xmlns:c14="http://schemas.microsoft.com/office/drawing/2007/8/2/chart" xmlns:mc="http://schemas.openxmlformats.org/markup-compatibility/2006">
+              <c:extLst xmlns:mc="http://schemas.openxmlformats.org/markup-compatibility/2006" xmlns:c14="http://schemas.microsoft.com/office/drawing/2007/8/2/chart" xmlns:c15="http://schemas.microsoft.com/office/drawing/2012/chart" xmlns:c16="http://schemas.microsoft.com/office/drawing/2014/chart">
                 <c:ext xmlns:c15="http://schemas.microsoft.com/office/drawing/2012/chart" uri="{CE6537A1-D6FC-4f65-9D91-7224C49458BB}">
                   <c15:layout>
                     <c:manualLayout>
@@ -2343,7 +2548,7 @@
             <c:showPercent val="0"/>
             <c:showBubbleSize val="0"/>
             <c:showLeaderLines val="0"/>
-            <c:extLst xmlns:c16="http://schemas.microsoft.com/office/drawing/2014/chart" xmlns:c15="http://schemas.microsoft.com/office/drawing/2012/chart" xmlns:c14="http://schemas.microsoft.com/office/drawing/2007/8/2/chart" xmlns:mc="http://schemas.openxmlformats.org/markup-compatibility/2006">
+            <c:extLst xmlns:mc="http://schemas.openxmlformats.org/markup-compatibility/2006" xmlns:c14="http://schemas.microsoft.com/office/drawing/2007/8/2/chart" xmlns:c15="http://schemas.microsoft.com/office/drawing/2012/chart" xmlns:c16="http://schemas.microsoft.com/office/drawing/2014/chart">
               <c:ext xmlns:c15="http://schemas.microsoft.com/office/drawing/2012/chart" uri="{CE6537A1-D6FC-4f65-9D91-7224C49458BB}">
                 <c15:showLeaderLines val="1"/>
                 <c15:leaderLines>
@@ -2398,7 +2603,7 @@
               </c:numCache>
             </c:numRef>
           </c:val>
-          <c:extLst xmlns:c16="http://schemas.microsoft.com/office/drawing/2014/chart" xmlns:c15="http://schemas.microsoft.com/office/drawing/2012/chart" xmlns:c14="http://schemas.microsoft.com/office/drawing/2007/8/2/chart" xmlns:mc="http://schemas.openxmlformats.org/markup-compatibility/2006">
+          <c:extLst xmlns:mc="http://schemas.openxmlformats.org/markup-compatibility/2006" xmlns:c14="http://schemas.microsoft.com/office/drawing/2007/8/2/chart" xmlns:c15="http://schemas.microsoft.com/office/drawing/2012/chart" xmlns:c16="http://schemas.microsoft.com/office/drawing/2014/chart">
             <c:ext xmlns:c16="http://schemas.microsoft.com/office/drawing/2014/chart" uri="{C3380CC4-5D6E-409C-BE32-E72D297353CC}">
               <c16:uniqueId val="{00000003-355C-46C5-8EE8-42EFA5183349}"/>
             </c:ext>
@@ -7335,7 +7540,7 @@
               <a:rPr lang="en-US" smtClean="0">
                 <a:latin typeface="Arial" panose="020B0604020202020204" pitchFamily="34" charset="0"/>
               </a:rPr>
-              <a:t>8/13/2021</a:t>
+              <a:t>8/15/2021</a:t>
             </a:fld>
             <a:endParaRPr lang="en-US" dirty="0">
               <a:latin typeface="Arial" panose="020B0604020202020204" pitchFamily="34" charset="0"/>
@@ -7514,7 +7719,7 @@
             <a:fld id="{0BA5BBE4-AEA3-489A-A28E-0C2FAF2506E3}" type="datetimeFigureOut">
               <a:rPr lang="en-US" smtClean="0"/>
               <a:pPr/>
-              <a:t>8/13/2021</a:t>
+              <a:t>8/15/2021</a:t>
             </a:fld>
             <a:endParaRPr lang="en-US" dirty="0"/>
           </a:p>
@@ -8892,13 +9097,13 @@
           <p:nvPr>
             <p:extLst>
               <p:ext uri="{D42A27DB-BD31-4B8C-83A1-F6EECF244321}">
-                <p14:modId xmlns:p14="http://schemas.microsoft.com/office/powerpoint/2010/main" val="893949083"/>
+                <p14:modId xmlns:p14="http://schemas.microsoft.com/office/powerpoint/2010/main" val="3776788011"/>
               </p:ext>
             </p:extLst>
           </p:nvPr>
         </p:nvGraphicFramePr>
         <p:xfrm>
-          <a:off x="590479" y="3683299"/>
+          <a:off x="692079" y="3683299"/>
           <a:ext cx="4572000" cy="2844848"/>
         </p:xfrm>
         <a:graphic>
@@ -8951,7 +9156,7 @@
         <p:fade/>
       </p:transition>
     </mc:Choice>
-    <mc:Fallback xmlns="" xmlns:c="http://schemas.openxmlformats.org/drawingml/2006/chart" xmlns:v="urn:schemas-microsoft-com:vml">
+    <mc:Fallback xmlns:v="urn:schemas-microsoft-com:vml" xmlns:c="http://schemas.openxmlformats.org/drawingml/2006/chart" xmlns="">
       <p:transition spd="med">
         <p:fade/>
       </p:transition>

</xml_diff>